<commit_message>
DataBinding preso and shitty Jquery example of it. Javascript 6 preso
</commit_message>
<xml_diff>
--- a/Introduction.pptx
+++ b/Introduction.pptx
@@ -293,7 +293,7 @@
             <a:fld id="{1D8BD707-D9CF-40AE-B4C6-C98DA3205C09}" type="datetimeFigureOut">
               <a:rPr lang="en-US" smtClean="0"/>
               <a:pPr/>
-              <a:t>4/8/2015</a:t>
+              <a:t>4/14/2015</a:t>
             </a:fld>
             <a:endParaRPr lang="en-US"/>
           </a:p>
@@ -460,7 +460,7 @@
             <a:fld id="{1D8BD707-D9CF-40AE-B4C6-C98DA3205C09}" type="datetimeFigureOut">
               <a:rPr lang="en-US" smtClean="0"/>
               <a:pPr/>
-              <a:t>4/8/2015</a:t>
+              <a:t>4/14/2015</a:t>
             </a:fld>
             <a:endParaRPr lang="en-US"/>
           </a:p>
@@ -637,7 +637,7 @@
             <a:fld id="{1D8BD707-D9CF-40AE-B4C6-C98DA3205C09}" type="datetimeFigureOut">
               <a:rPr lang="en-US" smtClean="0"/>
               <a:pPr/>
-              <a:t>4/8/2015</a:t>
+              <a:t>4/14/2015</a:t>
             </a:fld>
             <a:endParaRPr lang="en-US"/>
           </a:p>
@@ -804,7 +804,7 @@
             <a:fld id="{1D8BD707-D9CF-40AE-B4C6-C98DA3205C09}" type="datetimeFigureOut">
               <a:rPr lang="en-US" smtClean="0"/>
               <a:pPr/>
-              <a:t>4/8/2015</a:t>
+              <a:t>4/14/2015</a:t>
             </a:fld>
             <a:endParaRPr lang="en-US"/>
           </a:p>
@@ -1047,7 +1047,7 @@
             <a:fld id="{1D8BD707-D9CF-40AE-B4C6-C98DA3205C09}" type="datetimeFigureOut">
               <a:rPr lang="en-US" smtClean="0"/>
               <a:pPr/>
-              <a:t>4/8/2015</a:t>
+              <a:t>4/14/2015</a:t>
             </a:fld>
             <a:endParaRPr lang="en-US"/>
           </a:p>
@@ -1332,7 +1332,7 @@
             <a:fld id="{1D8BD707-D9CF-40AE-B4C6-C98DA3205C09}" type="datetimeFigureOut">
               <a:rPr lang="en-US" smtClean="0"/>
               <a:pPr/>
-              <a:t>4/8/2015</a:t>
+              <a:t>4/14/2015</a:t>
             </a:fld>
             <a:endParaRPr lang="en-US"/>
           </a:p>
@@ -1751,7 +1751,7 @@
             <a:fld id="{1D8BD707-D9CF-40AE-B4C6-C98DA3205C09}" type="datetimeFigureOut">
               <a:rPr lang="en-US" smtClean="0"/>
               <a:pPr/>
-              <a:t>4/8/2015</a:t>
+              <a:t>4/14/2015</a:t>
             </a:fld>
             <a:endParaRPr lang="en-US"/>
           </a:p>
@@ -1866,7 +1866,7 @@
             <a:fld id="{1D8BD707-D9CF-40AE-B4C6-C98DA3205C09}" type="datetimeFigureOut">
               <a:rPr lang="en-US" smtClean="0"/>
               <a:pPr/>
-              <a:t>4/8/2015</a:t>
+              <a:t>4/14/2015</a:t>
             </a:fld>
             <a:endParaRPr lang="en-US"/>
           </a:p>
@@ -1958,7 +1958,7 @@
             <a:fld id="{1D8BD707-D9CF-40AE-B4C6-C98DA3205C09}" type="datetimeFigureOut">
               <a:rPr lang="en-US" smtClean="0"/>
               <a:pPr/>
-              <a:t>4/8/2015</a:t>
+              <a:t>4/14/2015</a:t>
             </a:fld>
             <a:endParaRPr lang="en-US"/>
           </a:p>
@@ -2232,7 +2232,7 @@
             <a:fld id="{1D8BD707-D9CF-40AE-B4C6-C98DA3205C09}" type="datetimeFigureOut">
               <a:rPr lang="en-US" smtClean="0"/>
               <a:pPr/>
-              <a:t>4/8/2015</a:t>
+              <a:t>4/14/2015</a:t>
             </a:fld>
             <a:endParaRPr lang="en-US"/>
           </a:p>
@@ -2482,7 +2482,7 @@
             <a:fld id="{1D8BD707-D9CF-40AE-B4C6-C98DA3205C09}" type="datetimeFigureOut">
               <a:rPr lang="en-US" smtClean="0"/>
               <a:pPr/>
-              <a:t>4/8/2015</a:t>
+              <a:t>4/14/2015</a:t>
             </a:fld>
             <a:endParaRPr lang="en-US"/>
           </a:p>
@@ -2692,7 +2692,7 @@
             <a:fld id="{1D8BD707-D9CF-40AE-B4C6-C98DA3205C09}" type="datetimeFigureOut">
               <a:rPr lang="en-US" smtClean="0"/>
               <a:pPr/>
-              <a:t>4/8/2015</a:t>
+              <a:t>4/14/2015</a:t>
             </a:fld>
             <a:endParaRPr lang="en-US"/>
           </a:p>
@@ -3201,6 +3201,21 @@
               <a:rPr lang="en-AU" dirty="0" smtClean="0"/>
               <a:t>Michael</a:t>
             </a:r>
+          </a:p>
+          <a:p>
+            <a:pPr lvl="1"/>
+            <a:r>
+              <a:rPr lang="en-AU" dirty="0" smtClean="0"/>
+              <a:t>Developer</a:t>
+            </a:r>
+          </a:p>
+          <a:p>
+            <a:pPr lvl="1"/>
+            <a:r>
+              <a:rPr lang="en-AU" dirty="0" smtClean="0"/>
+              <a:t>8 years experience in Melbourne including Human Resources, Talent Management and Insurance</a:t>
+            </a:r>
+            <a:endParaRPr lang="en-AU" dirty="0" smtClean="0"/>
           </a:p>
         </p:txBody>
       </p:sp>

</xml_diff>